<commit_message>
merged input from Yuta
</commit_message>
<xml_diff>
--- a/117/OPSAWG/draft-opsawg-ipfix-srv6-srh-and-on-path-telemetry.pptx
+++ b/117/OPSAWG/draft-opsawg-ipfix-srv6-srh-and-on-path-telemetry.pptx
@@ -117,8 +117,157 @@
 </p:presentation>
 </file>
 
+<file path=ppt/revisionInfo.xml><?xml version="1.0" encoding="utf-8"?>
+<p1510:revInfo xmlns:a="http://schemas.openxmlformats.org/drawingml/2006/main" xmlns:r="http://schemas.openxmlformats.org/officeDocument/2006/relationships" xmlns:p1510="http://schemas.microsoft.com/office/powerpoint/2015/10/main">
+  <p1510:revLst>
+    <p1510:client id="{9017E611-F6E5-45E5-9BC5-410F9EDC6A92}" v="3" dt="2023-07-24T20:08:24.130"/>
+  </p1510:revLst>
+</p1510:revInfo>
+</file>
+
 <file path=ppt/changesInfos/changesInfo1.xml><?xml version="1.0" encoding="utf-8"?>
 <pc:chgInfo xmlns:a="http://schemas.openxmlformats.org/drawingml/2006/main" xmlns:r="http://schemas.openxmlformats.org/officeDocument/2006/relationships" xmlns:ac="http://schemas.microsoft.com/office/drawing/2013/main/command" xmlns:pc="http://schemas.microsoft.com/office/powerpoint/2013/main/command">
+  <pc:docChgLst>
+    <pc:chgData name="Graf Thomas, INI-NET-TCZ-ZH1" userId="487bc3e3-9ce7-4cdd-b7b4-8899ea88d289" providerId="ADAL" clId="{7C1D34EF-CEA2-4154-BF78-1DCB1789E4C5}"/>
+    <pc:docChg chg="undo custSel addSld delSld modSld">
+      <pc:chgData name="Graf Thomas, INI-NET-TCZ-ZH1" userId="487bc3e3-9ce7-4cdd-b7b4-8899ea88d289" providerId="ADAL" clId="{7C1D34EF-CEA2-4154-BF78-1DCB1789E4C5}" dt="2022-07-28T15:18:58.663" v="173" actId="113"/>
+      <pc:docMkLst>
+        <pc:docMk/>
+      </pc:docMkLst>
+      <pc:sldChg chg="modSp mod">
+        <pc:chgData name="Graf Thomas, INI-NET-TCZ-ZH1" userId="487bc3e3-9ce7-4cdd-b7b4-8899ea88d289" providerId="ADAL" clId="{7C1D34EF-CEA2-4154-BF78-1DCB1789E4C5}" dt="2022-07-28T15:08:00.167" v="5" actId="20577"/>
+        <pc:sldMkLst>
+          <pc:docMk/>
+          <pc:sldMk cId="3578665336" sldId="1041"/>
+        </pc:sldMkLst>
+        <pc:spChg chg="mod">
+          <ac:chgData name="Graf Thomas, INI-NET-TCZ-ZH1" userId="487bc3e3-9ce7-4cdd-b7b4-8899ea88d289" providerId="ADAL" clId="{7C1D34EF-CEA2-4154-BF78-1DCB1789E4C5}" dt="2022-07-28T15:07:55.513" v="1" actId="20577"/>
+          <ac:spMkLst>
+            <pc:docMk/>
+            <pc:sldMk cId="3578665336" sldId="1041"/>
+            <ac:spMk id="5" creationId="{C26208B2-0D10-4C23-B2DE-372A62E98644}"/>
+          </ac:spMkLst>
+        </pc:spChg>
+        <pc:spChg chg="mod">
+          <ac:chgData name="Graf Thomas, INI-NET-TCZ-ZH1" userId="487bc3e3-9ce7-4cdd-b7b4-8899ea88d289" providerId="ADAL" clId="{7C1D34EF-CEA2-4154-BF78-1DCB1789E4C5}" dt="2022-07-28T15:08:00.167" v="5" actId="20577"/>
+          <ac:spMkLst>
+            <pc:docMk/>
+            <pc:sldMk cId="3578665336" sldId="1041"/>
+            <ac:spMk id="6" creationId="{6CAA0765-1318-4A03-8F91-D3ECC43D8FA7}"/>
+          </ac:spMkLst>
+        </pc:spChg>
+      </pc:sldChg>
+      <pc:sldChg chg="addSp delSp modSp mod">
+        <pc:chgData name="Graf Thomas, INI-NET-TCZ-ZH1" userId="487bc3e3-9ce7-4cdd-b7b4-8899ea88d289" providerId="ADAL" clId="{7C1D34EF-CEA2-4154-BF78-1DCB1789E4C5}" dt="2022-07-28T15:17:06.002" v="69" actId="20577"/>
+        <pc:sldMkLst>
+          <pc:docMk/>
+          <pc:sldMk cId="728278235" sldId="1053"/>
+        </pc:sldMkLst>
+        <pc:spChg chg="mod">
+          <ac:chgData name="Graf Thomas, INI-NET-TCZ-ZH1" userId="487bc3e3-9ce7-4cdd-b7b4-8899ea88d289" providerId="ADAL" clId="{7C1D34EF-CEA2-4154-BF78-1DCB1789E4C5}" dt="2022-07-28T15:17:06.002" v="69" actId="20577"/>
+          <ac:spMkLst>
+            <pc:docMk/>
+            <pc:sldMk cId="728278235" sldId="1053"/>
+            <ac:spMk id="3" creationId="{29C0DFD4-432D-4B0C-93DF-790441DCF5B9}"/>
+          </ac:spMkLst>
+        </pc:spChg>
+        <pc:picChg chg="add del mod">
+          <ac:chgData name="Graf Thomas, INI-NET-TCZ-ZH1" userId="487bc3e3-9ce7-4cdd-b7b4-8899ea88d289" providerId="ADAL" clId="{7C1D34EF-CEA2-4154-BF78-1DCB1789E4C5}" dt="2022-07-28T15:10:11.394" v="16" actId="478"/>
+          <ac:picMkLst>
+            <pc:docMk/>
+            <pc:sldMk cId="728278235" sldId="1053"/>
+            <ac:picMk id="5" creationId="{00FB2CC6-B16D-4037-A221-279CE3E497B5}"/>
+          </ac:picMkLst>
+        </pc:picChg>
+        <pc:picChg chg="del">
+          <ac:chgData name="Graf Thomas, INI-NET-TCZ-ZH1" userId="487bc3e3-9ce7-4cdd-b7b4-8899ea88d289" providerId="ADAL" clId="{7C1D34EF-CEA2-4154-BF78-1DCB1789E4C5}" dt="2022-07-28T15:09:52.272" v="10" actId="478"/>
+          <ac:picMkLst>
+            <pc:docMk/>
+            <pc:sldMk cId="728278235" sldId="1053"/>
+            <ac:picMk id="6" creationId="{6054F088-8D4E-4189-829C-1B22E5CEB81A}"/>
+          </ac:picMkLst>
+        </pc:picChg>
+        <pc:picChg chg="add mod">
+          <ac:chgData name="Graf Thomas, INI-NET-TCZ-ZH1" userId="487bc3e3-9ce7-4cdd-b7b4-8899ea88d289" providerId="ADAL" clId="{7C1D34EF-CEA2-4154-BF78-1DCB1789E4C5}" dt="2022-07-28T15:10:22.134" v="21" actId="1076"/>
+          <ac:picMkLst>
+            <pc:docMk/>
+            <pc:sldMk cId="728278235" sldId="1053"/>
+            <ac:picMk id="8" creationId="{76EAF276-B346-4EFE-A473-E5A230C47F47}"/>
+          </ac:picMkLst>
+        </pc:picChg>
+      </pc:sldChg>
+      <pc:sldChg chg="addSp delSp modSp add del mod">
+        <pc:chgData name="Graf Thomas, INI-NET-TCZ-ZH1" userId="487bc3e3-9ce7-4cdd-b7b4-8899ea88d289" providerId="ADAL" clId="{7C1D34EF-CEA2-4154-BF78-1DCB1789E4C5}" dt="2022-07-28T15:18:58.663" v="173" actId="113"/>
+        <pc:sldMkLst>
+          <pc:docMk/>
+          <pc:sldMk cId="982353549" sldId="26412"/>
+        </pc:sldMkLst>
+        <pc:spChg chg="mod">
+          <ac:chgData name="Graf Thomas, INI-NET-TCZ-ZH1" userId="487bc3e3-9ce7-4cdd-b7b4-8899ea88d289" providerId="ADAL" clId="{7C1D34EF-CEA2-4154-BF78-1DCB1789E4C5}" dt="2022-07-28T15:18:58.663" v="173" actId="113"/>
+          <ac:spMkLst>
+            <pc:docMk/>
+            <pc:sldMk cId="982353549" sldId="26412"/>
+            <ac:spMk id="3" creationId="{29C0DFD4-432D-4B0C-93DF-790441DCF5B9}"/>
+          </ac:spMkLst>
+        </pc:spChg>
+        <pc:spChg chg="add del">
+          <ac:chgData name="Graf Thomas, INI-NET-TCZ-ZH1" userId="487bc3e3-9ce7-4cdd-b7b4-8899ea88d289" providerId="ADAL" clId="{7C1D34EF-CEA2-4154-BF78-1DCB1789E4C5}" dt="2022-07-28T15:15:26.794" v="42"/>
+          <ac:spMkLst>
+            <pc:docMk/>
+            <pc:sldMk cId="982353549" sldId="26412"/>
+            <ac:spMk id="9" creationId="{6AC8985A-63D5-4822-B626-C7853D824662}"/>
+          </ac:spMkLst>
+        </pc:spChg>
+        <pc:picChg chg="del">
+          <ac:chgData name="Graf Thomas, INI-NET-TCZ-ZH1" userId="487bc3e3-9ce7-4cdd-b7b4-8899ea88d289" providerId="ADAL" clId="{7C1D34EF-CEA2-4154-BF78-1DCB1789E4C5}" dt="2022-07-28T15:11:43.615" v="22" actId="478"/>
+          <ac:picMkLst>
+            <pc:docMk/>
+            <pc:sldMk cId="982353549" sldId="26412"/>
+            <ac:picMk id="5" creationId="{DC7CD995-EE64-4785-8045-4B7C44938076}"/>
+          </ac:picMkLst>
+        </pc:picChg>
+        <pc:picChg chg="add del mod">
+          <ac:chgData name="Graf Thomas, INI-NET-TCZ-ZH1" userId="487bc3e3-9ce7-4cdd-b7b4-8899ea88d289" providerId="ADAL" clId="{7C1D34EF-CEA2-4154-BF78-1DCB1789E4C5}" dt="2022-07-28T15:13:55.526" v="32" actId="478"/>
+          <ac:picMkLst>
+            <pc:docMk/>
+            <pc:sldMk cId="982353549" sldId="26412"/>
+            <ac:picMk id="6" creationId="{2462F735-170B-452A-B18E-37D5BF97797B}"/>
+          </ac:picMkLst>
+        </pc:picChg>
+        <pc:picChg chg="add del mod">
+          <ac:chgData name="Graf Thomas, INI-NET-TCZ-ZH1" userId="487bc3e3-9ce7-4cdd-b7b4-8899ea88d289" providerId="ADAL" clId="{7C1D34EF-CEA2-4154-BF78-1DCB1789E4C5}" dt="2022-07-28T15:14:50.592" v="39" actId="1076"/>
+          <ac:picMkLst>
+            <pc:docMk/>
+            <pc:sldMk cId="982353549" sldId="26412"/>
+            <ac:picMk id="8" creationId="{FC511AB1-E996-44EB-90E9-D57B66FBC73C}"/>
+          </ac:picMkLst>
+        </pc:picChg>
+      </pc:sldChg>
+      <pc:sldChg chg="addSp delSp modSp mod">
+        <pc:chgData name="Graf Thomas, INI-NET-TCZ-ZH1" userId="487bc3e3-9ce7-4cdd-b7b4-8899ea88d289" providerId="ADAL" clId="{7C1D34EF-CEA2-4154-BF78-1DCB1789E4C5}" dt="2022-07-28T15:13:50.913" v="30" actId="22"/>
+        <pc:sldMkLst>
+          <pc:docMk/>
+          <pc:sldMk cId="958437681" sldId="26413"/>
+        </pc:sldMkLst>
+        <pc:spChg chg="mod">
+          <ac:chgData name="Graf Thomas, INI-NET-TCZ-ZH1" userId="487bc3e3-9ce7-4cdd-b7b4-8899ea88d289" providerId="ADAL" clId="{7C1D34EF-CEA2-4154-BF78-1DCB1789E4C5}" dt="2022-07-28T15:08:20.663" v="9" actId="20577"/>
+          <ac:spMkLst>
+            <pc:docMk/>
+            <pc:sldMk cId="958437681" sldId="26413"/>
+            <ac:spMk id="7" creationId="{BF6DCC5D-2508-4A9B-B734-C8C5147F93FB}"/>
+          </ac:spMkLst>
+        </pc:spChg>
+        <pc:picChg chg="add del">
+          <ac:chgData name="Graf Thomas, INI-NET-TCZ-ZH1" userId="487bc3e3-9ce7-4cdd-b7b4-8899ea88d289" providerId="ADAL" clId="{7C1D34EF-CEA2-4154-BF78-1DCB1789E4C5}" dt="2022-07-28T15:13:50.913" v="30" actId="22"/>
+          <ac:picMkLst>
+            <pc:docMk/>
+            <pc:sldMk cId="958437681" sldId="26413"/>
+            <ac:picMk id="5" creationId="{DFF0268C-A4B5-42E5-BB84-1E7CCA77A167}"/>
+          </ac:picMkLst>
+        </pc:picChg>
+      </pc:sldChg>
+    </pc:docChg>
+  </pc:docChgLst>
   <pc:docChgLst>
     <pc:chgData name="Graf Thomas, INI-NET-VNC-HCS" userId="487bc3e3-9ce7-4cdd-b7b4-8899ea88d289" providerId="ADAL" clId="{E6FCBAD8-6499-4E57-B2C0-48559DB84434}"/>
     <pc:docChg chg="modSld">
@@ -184,6 +333,76 @@
             <pc:docMk/>
             <pc:sldMk cId="2578889968" sldId="26415"/>
             <ac:spMk id="7" creationId="{BF6DCC5D-2508-4A9B-B734-C8C5147F93FB}"/>
+          </ac:spMkLst>
+        </pc:spChg>
+      </pc:sldChg>
+    </pc:docChg>
+  </pc:docChgLst>
+  <pc:docChgLst>
+    <pc:chgData name="Graf Thomas, INI-NET-VNC-HCS" userId="487bc3e3-9ce7-4cdd-b7b4-8899ea88d289" providerId="ADAL" clId="{9017E611-F6E5-45E5-9BC5-410F9EDC6A92}"/>
+    <pc:docChg chg="modSld">
+      <pc:chgData name="Graf Thomas, INI-NET-VNC-HCS" userId="487bc3e3-9ce7-4cdd-b7b4-8899ea88d289" providerId="ADAL" clId="{9017E611-F6E5-45E5-9BC5-410F9EDC6A92}" dt="2023-07-24T20:09:15.911" v="72" actId="20577"/>
+      <pc:docMkLst>
+        <pc:docMk/>
+      </pc:docMkLst>
+      <pc:sldChg chg="modSp mod">
+        <pc:chgData name="Graf Thomas, INI-NET-VNC-HCS" userId="487bc3e3-9ce7-4cdd-b7b4-8899ea88d289" providerId="ADAL" clId="{9017E611-F6E5-45E5-9BC5-410F9EDC6A92}" dt="2023-07-24T20:08:34.922" v="37" actId="20577"/>
+        <pc:sldMkLst>
+          <pc:docMk/>
+          <pc:sldMk cId="3578665336" sldId="1041"/>
+        </pc:sldMkLst>
+        <pc:spChg chg="mod">
+          <ac:chgData name="Graf Thomas, INI-NET-VNC-HCS" userId="487bc3e3-9ce7-4cdd-b7b4-8899ea88d289" providerId="ADAL" clId="{9017E611-F6E5-45E5-9BC5-410F9EDC6A92}" dt="2023-07-24T20:08:34.922" v="37" actId="20577"/>
+          <ac:spMkLst>
+            <pc:docMk/>
+            <pc:sldMk cId="3578665336" sldId="1041"/>
+            <ac:spMk id="6" creationId="{6CAA0765-1318-4A03-8F91-D3ECC43D8FA7}"/>
+          </ac:spMkLst>
+        </pc:spChg>
+      </pc:sldChg>
+      <pc:sldChg chg="modSp mod">
+        <pc:chgData name="Graf Thomas, INI-NET-VNC-HCS" userId="487bc3e3-9ce7-4cdd-b7b4-8899ea88d289" providerId="ADAL" clId="{9017E611-F6E5-45E5-9BC5-410F9EDC6A92}" dt="2023-07-24T20:09:15.911" v="72" actId="20577"/>
+        <pc:sldMkLst>
+          <pc:docMk/>
+          <pc:sldMk cId="958437681" sldId="26413"/>
+        </pc:sldMkLst>
+        <pc:spChg chg="mod">
+          <ac:chgData name="Graf Thomas, INI-NET-VNC-HCS" userId="487bc3e3-9ce7-4cdd-b7b4-8899ea88d289" providerId="ADAL" clId="{9017E611-F6E5-45E5-9BC5-410F9EDC6A92}" dt="2023-07-24T20:09:08.476" v="70" actId="6549"/>
+          <ac:spMkLst>
+            <pc:docMk/>
+            <pc:sldMk cId="958437681" sldId="26413"/>
+            <ac:spMk id="3" creationId="{29C0DFD4-432D-4B0C-93DF-790441DCF5B9}"/>
+          </ac:spMkLst>
+        </pc:spChg>
+        <pc:spChg chg="mod">
+          <ac:chgData name="Graf Thomas, INI-NET-VNC-HCS" userId="487bc3e3-9ce7-4cdd-b7b4-8899ea88d289" providerId="ADAL" clId="{9017E611-F6E5-45E5-9BC5-410F9EDC6A92}" dt="2023-07-24T20:09:15.911" v="72" actId="20577"/>
+          <ac:spMkLst>
+            <pc:docMk/>
+            <pc:sldMk cId="958437681" sldId="26413"/>
+            <ac:spMk id="4" creationId="{379EB07A-5D4A-0443-6963-4EF909AAC4B3}"/>
+          </ac:spMkLst>
+        </pc:spChg>
+      </pc:sldChg>
+      <pc:sldChg chg="modSp mod">
+        <pc:chgData name="Graf Thomas, INI-NET-VNC-HCS" userId="487bc3e3-9ce7-4cdd-b7b4-8899ea88d289" providerId="ADAL" clId="{9017E611-F6E5-45E5-9BC5-410F9EDC6A92}" dt="2023-07-24T20:08:53.078" v="65" actId="20577"/>
+        <pc:sldMkLst>
+          <pc:docMk/>
+          <pc:sldMk cId="3708108621" sldId="26416"/>
+        </pc:sldMkLst>
+        <pc:spChg chg="mod">
+          <ac:chgData name="Graf Thomas, INI-NET-VNC-HCS" userId="487bc3e3-9ce7-4cdd-b7b4-8899ea88d289" providerId="ADAL" clId="{9017E611-F6E5-45E5-9BC5-410F9EDC6A92}" dt="2023-07-24T20:08:53.078" v="65" actId="20577"/>
+          <ac:spMkLst>
+            <pc:docMk/>
+            <pc:sldMk cId="3708108621" sldId="26416"/>
+            <ac:spMk id="3" creationId="{29C0DFD4-432D-4B0C-93DF-790441DCF5B9}"/>
+          </ac:spMkLst>
+        </pc:spChg>
+        <pc:spChg chg="mod">
+          <ac:chgData name="Graf Thomas, INI-NET-VNC-HCS" userId="487bc3e3-9ce7-4cdd-b7b4-8899ea88d289" providerId="ADAL" clId="{9017E611-F6E5-45E5-9BC5-410F9EDC6A92}" dt="2023-07-24T20:08:31.093" v="35" actId="20577"/>
+          <ac:spMkLst>
+            <pc:docMk/>
+            <pc:sldMk cId="3708108621" sldId="26416"/>
+            <ac:spMk id="4" creationId="{93744C72-514D-9234-35A7-D1F94B85F4EF}"/>
           </ac:spMkLst>
         </pc:spChg>
       </pc:sldChg>
@@ -818,143 +1037,26 @@
     </pc:docChg>
   </pc:docChgLst>
   <pc:docChgLst>
-    <pc:chgData name="Graf Thomas, INI-NET-TCZ-ZH1" userId="487bc3e3-9ce7-4cdd-b7b4-8899ea88d289" providerId="ADAL" clId="{7C1D34EF-CEA2-4154-BF78-1DCB1789E4C5}"/>
-    <pc:docChg chg="undo custSel addSld delSld modSld">
-      <pc:chgData name="Graf Thomas, INI-NET-TCZ-ZH1" userId="487bc3e3-9ce7-4cdd-b7b4-8899ea88d289" providerId="ADAL" clId="{7C1D34EF-CEA2-4154-BF78-1DCB1789E4C5}" dt="2022-07-28T15:18:58.663" v="173" actId="113"/>
+    <pc:chgData name="Graf Thomas, INI-NET-DCF" userId="487bc3e3-9ce7-4cdd-b7b4-8899ea88d289" providerId="ADAL" clId="{36E6DFBC-EB3C-4D3C-97F7-C6A855FFE787}"/>
+    <pc:docChg chg="modSld">
+      <pc:chgData name="Graf Thomas, INI-NET-DCF" userId="487bc3e3-9ce7-4cdd-b7b4-8899ea88d289" providerId="ADAL" clId="{36E6DFBC-EB3C-4D3C-97F7-C6A855FFE787}" dt="2020-07-27T12:02:41.304" v="1" actId="20577"/>
       <pc:docMkLst>
         <pc:docMk/>
       </pc:docMkLst>
-      <pc:sldChg chg="modSp mod">
-        <pc:chgData name="Graf Thomas, INI-NET-TCZ-ZH1" userId="487bc3e3-9ce7-4cdd-b7b4-8899ea88d289" providerId="ADAL" clId="{7C1D34EF-CEA2-4154-BF78-1DCB1789E4C5}" dt="2022-07-28T15:08:00.167" v="5" actId="20577"/>
+      <pc:sldChg chg="modSp">
+        <pc:chgData name="Graf Thomas, INI-NET-DCF" userId="487bc3e3-9ce7-4cdd-b7b4-8899ea88d289" providerId="ADAL" clId="{36E6DFBC-EB3C-4D3C-97F7-C6A855FFE787}" dt="2020-07-27T12:02:41.304" v="1" actId="20577"/>
         <pc:sldMkLst>
           <pc:docMk/>
-          <pc:sldMk cId="3578665336" sldId="1041"/>
+          <pc:sldMk cId="3529422000" sldId="1048"/>
         </pc:sldMkLst>
         <pc:spChg chg="mod">
-          <ac:chgData name="Graf Thomas, INI-NET-TCZ-ZH1" userId="487bc3e3-9ce7-4cdd-b7b4-8899ea88d289" providerId="ADAL" clId="{7C1D34EF-CEA2-4154-BF78-1DCB1789E4C5}" dt="2022-07-28T15:07:55.513" v="1" actId="20577"/>
-          <ac:spMkLst>
-            <pc:docMk/>
-            <pc:sldMk cId="3578665336" sldId="1041"/>
+          <ac:chgData name="Graf Thomas, INI-NET-DCF" userId="487bc3e3-9ce7-4cdd-b7b4-8899ea88d289" providerId="ADAL" clId="{36E6DFBC-EB3C-4D3C-97F7-C6A855FFE787}" dt="2020-07-27T12:02:41.304" v="1" actId="20577"/>
+          <ac:spMkLst>
+            <pc:docMk/>
+            <pc:sldMk cId="3529422000" sldId="1048"/>
             <ac:spMk id="5" creationId="{C26208B2-0D10-4C23-B2DE-372A62E98644}"/>
           </ac:spMkLst>
         </pc:spChg>
-        <pc:spChg chg="mod">
-          <ac:chgData name="Graf Thomas, INI-NET-TCZ-ZH1" userId="487bc3e3-9ce7-4cdd-b7b4-8899ea88d289" providerId="ADAL" clId="{7C1D34EF-CEA2-4154-BF78-1DCB1789E4C5}" dt="2022-07-28T15:08:00.167" v="5" actId="20577"/>
-          <ac:spMkLst>
-            <pc:docMk/>
-            <pc:sldMk cId="3578665336" sldId="1041"/>
-            <ac:spMk id="6" creationId="{6CAA0765-1318-4A03-8F91-D3ECC43D8FA7}"/>
-          </ac:spMkLst>
-        </pc:spChg>
-      </pc:sldChg>
-      <pc:sldChg chg="addSp delSp modSp mod">
-        <pc:chgData name="Graf Thomas, INI-NET-TCZ-ZH1" userId="487bc3e3-9ce7-4cdd-b7b4-8899ea88d289" providerId="ADAL" clId="{7C1D34EF-CEA2-4154-BF78-1DCB1789E4C5}" dt="2022-07-28T15:17:06.002" v="69" actId="20577"/>
-        <pc:sldMkLst>
-          <pc:docMk/>
-          <pc:sldMk cId="728278235" sldId="1053"/>
-        </pc:sldMkLst>
-        <pc:spChg chg="mod">
-          <ac:chgData name="Graf Thomas, INI-NET-TCZ-ZH1" userId="487bc3e3-9ce7-4cdd-b7b4-8899ea88d289" providerId="ADAL" clId="{7C1D34EF-CEA2-4154-BF78-1DCB1789E4C5}" dt="2022-07-28T15:17:06.002" v="69" actId="20577"/>
-          <ac:spMkLst>
-            <pc:docMk/>
-            <pc:sldMk cId="728278235" sldId="1053"/>
-            <ac:spMk id="3" creationId="{29C0DFD4-432D-4B0C-93DF-790441DCF5B9}"/>
-          </ac:spMkLst>
-        </pc:spChg>
-        <pc:picChg chg="add del mod">
-          <ac:chgData name="Graf Thomas, INI-NET-TCZ-ZH1" userId="487bc3e3-9ce7-4cdd-b7b4-8899ea88d289" providerId="ADAL" clId="{7C1D34EF-CEA2-4154-BF78-1DCB1789E4C5}" dt="2022-07-28T15:10:11.394" v="16" actId="478"/>
-          <ac:picMkLst>
-            <pc:docMk/>
-            <pc:sldMk cId="728278235" sldId="1053"/>
-            <ac:picMk id="5" creationId="{00FB2CC6-B16D-4037-A221-279CE3E497B5}"/>
-          </ac:picMkLst>
-        </pc:picChg>
-        <pc:picChg chg="del">
-          <ac:chgData name="Graf Thomas, INI-NET-TCZ-ZH1" userId="487bc3e3-9ce7-4cdd-b7b4-8899ea88d289" providerId="ADAL" clId="{7C1D34EF-CEA2-4154-BF78-1DCB1789E4C5}" dt="2022-07-28T15:09:52.272" v="10" actId="478"/>
-          <ac:picMkLst>
-            <pc:docMk/>
-            <pc:sldMk cId="728278235" sldId="1053"/>
-            <ac:picMk id="6" creationId="{6054F088-8D4E-4189-829C-1B22E5CEB81A}"/>
-          </ac:picMkLst>
-        </pc:picChg>
-        <pc:picChg chg="add mod">
-          <ac:chgData name="Graf Thomas, INI-NET-TCZ-ZH1" userId="487bc3e3-9ce7-4cdd-b7b4-8899ea88d289" providerId="ADAL" clId="{7C1D34EF-CEA2-4154-BF78-1DCB1789E4C5}" dt="2022-07-28T15:10:22.134" v="21" actId="1076"/>
-          <ac:picMkLst>
-            <pc:docMk/>
-            <pc:sldMk cId="728278235" sldId="1053"/>
-            <ac:picMk id="8" creationId="{76EAF276-B346-4EFE-A473-E5A230C47F47}"/>
-          </ac:picMkLst>
-        </pc:picChg>
-      </pc:sldChg>
-      <pc:sldChg chg="addSp delSp modSp add del mod">
-        <pc:chgData name="Graf Thomas, INI-NET-TCZ-ZH1" userId="487bc3e3-9ce7-4cdd-b7b4-8899ea88d289" providerId="ADAL" clId="{7C1D34EF-CEA2-4154-BF78-1DCB1789E4C5}" dt="2022-07-28T15:18:58.663" v="173" actId="113"/>
-        <pc:sldMkLst>
-          <pc:docMk/>
-          <pc:sldMk cId="982353549" sldId="26412"/>
-        </pc:sldMkLst>
-        <pc:spChg chg="mod">
-          <ac:chgData name="Graf Thomas, INI-NET-TCZ-ZH1" userId="487bc3e3-9ce7-4cdd-b7b4-8899ea88d289" providerId="ADAL" clId="{7C1D34EF-CEA2-4154-BF78-1DCB1789E4C5}" dt="2022-07-28T15:18:58.663" v="173" actId="113"/>
-          <ac:spMkLst>
-            <pc:docMk/>
-            <pc:sldMk cId="982353549" sldId="26412"/>
-            <ac:spMk id="3" creationId="{29C0DFD4-432D-4B0C-93DF-790441DCF5B9}"/>
-          </ac:spMkLst>
-        </pc:spChg>
-        <pc:spChg chg="add del">
-          <ac:chgData name="Graf Thomas, INI-NET-TCZ-ZH1" userId="487bc3e3-9ce7-4cdd-b7b4-8899ea88d289" providerId="ADAL" clId="{7C1D34EF-CEA2-4154-BF78-1DCB1789E4C5}" dt="2022-07-28T15:15:26.794" v="42"/>
-          <ac:spMkLst>
-            <pc:docMk/>
-            <pc:sldMk cId="982353549" sldId="26412"/>
-            <ac:spMk id="9" creationId="{6AC8985A-63D5-4822-B626-C7853D824662}"/>
-          </ac:spMkLst>
-        </pc:spChg>
-        <pc:picChg chg="del">
-          <ac:chgData name="Graf Thomas, INI-NET-TCZ-ZH1" userId="487bc3e3-9ce7-4cdd-b7b4-8899ea88d289" providerId="ADAL" clId="{7C1D34EF-CEA2-4154-BF78-1DCB1789E4C5}" dt="2022-07-28T15:11:43.615" v="22" actId="478"/>
-          <ac:picMkLst>
-            <pc:docMk/>
-            <pc:sldMk cId="982353549" sldId="26412"/>
-            <ac:picMk id="5" creationId="{DC7CD995-EE64-4785-8045-4B7C44938076}"/>
-          </ac:picMkLst>
-        </pc:picChg>
-        <pc:picChg chg="add del mod">
-          <ac:chgData name="Graf Thomas, INI-NET-TCZ-ZH1" userId="487bc3e3-9ce7-4cdd-b7b4-8899ea88d289" providerId="ADAL" clId="{7C1D34EF-CEA2-4154-BF78-1DCB1789E4C5}" dt="2022-07-28T15:13:55.526" v="32" actId="478"/>
-          <ac:picMkLst>
-            <pc:docMk/>
-            <pc:sldMk cId="982353549" sldId="26412"/>
-            <ac:picMk id="6" creationId="{2462F735-170B-452A-B18E-37D5BF97797B}"/>
-          </ac:picMkLst>
-        </pc:picChg>
-        <pc:picChg chg="add del mod">
-          <ac:chgData name="Graf Thomas, INI-NET-TCZ-ZH1" userId="487bc3e3-9ce7-4cdd-b7b4-8899ea88d289" providerId="ADAL" clId="{7C1D34EF-CEA2-4154-BF78-1DCB1789E4C5}" dt="2022-07-28T15:14:50.592" v="39" actId="1076"/>
-          <ac:picMkLst>
-            <pc:docMk/>
-            <pc:sldMk cId="982353549" sldId="26412"/>
-            <ac:picMk id="8" creationId="{FC511AB1-E996-44EB-90E9-D57B66FBC73C}"/>
-          </ac:picMkLst>
-        </pc:picChg>
-      </pc:sldChg>
-      <pc:sldChg chg="addSp delSp modSp mod">
-        <pc:chgData name="Graf Thomas, INI-NET-TCZ-ZH1" userId="487bc3e3-9ce7-4cdd-b7b4-8899ea88d289" providerId="ADAL" clId="{7C1D34EF-CEA2-4154-BF78-1DCB1789E4C5}" dt="2022-07-28T15:13:50.913" v="30" actId="22"/>
-        <pc:sldMkLst>
-          <pc:docMk/>
-          <pc:sldMk cId="958437681" sldId="26413"/>
-        </pc:sldMkLst>
-        <pc:spChg chg="mod">
-          <ac:chgData name="Graf Thomas, INI-NET-TCZ-ZH1" userId="487bc3e3-9ce7-4cdd-b7b4-8899ea88d289" providerId="ADAL" clId="{7C1D34EF-CEA2-4154-BF78-1DCB1789E4C5}" dt="2022-07-28T15:08:20.663" v="9" actId="20577"/>
-          <ac:spMkLst>
-            <pc:docMk/>
-            <pc:sldMk cId="958437681" sldId="26413"/>
-            <ac:spMk id="7" creationId="{BF6DCC5D-2508-4A9B-B734-C8C5147F93FB}"/>
-          </ac:spMkLst>
-        </pc:spChg>
-        <pc:picChg chg="add del">
-          <ac:chgData name="Graf Thomas, INI-NET-TCZ-ZH1" userId="487bc3e3-9ce7-4cdd-b7b4-8899ea88d289" providerId="ADAL" clId="{7C1D34EF-CEA2-4154-BF78-1DCB1789E4C5}" dt="2022-07-28T15:13:50.913" v="30" actId="22"/>
-          <ac:picMkLst>
-            <pc:docMk/>
-            <pc:sldMk cId="958437681" sldId="26413"/>
-            <ac:picMk id="5" creationId="{DFF0268C-A4B5-42E5-BB84-1E7CCA77A167}"/>
-          </ac:picMkLst>
-        </pc:picChg>
       </pc:sldChg>
     </pc:docChg>
   </pc:docChgLst>
@@ -1180,30 +1282,6 @@
             <pc:docMk/>
             <pc:sldMk cId="3529422000" sldId="1048"/>
             <ac:spMk id="6" creationId="{76B60DEE-AB49-47F4-AC01-C954634AD15B}"/>
-          </ac:spMkLst>
-        </pc:spChg>
-      </pc:sldChg>
-    </pc:docChg>
-  </pc:docChgLst>
-  <pc:docChgLst>
-    <pc:chgData name="Graf Thomas, INI-NET-DCF" userId="487bc3e3-9ce7-4cdd-b7b4-8899ea88d289" providerId="ADAL" clId="{36E6DFBC-EB3C-4D3C-97F7-C6A855FFE787}"/>
-    <pc:docChg chg="modSld">
-      <pc:chgData name="Graf Thomas, INI-NET-DCF" userId="487bc3e3-9ce7-4cdd-b7b4-8899ea88d289" providerId="ADAL" clId="{36E6DFBC-EB3C-4D3C-97F7-C6A855FFE787}" dt="2020-07-27T12:02:41.304" v="1" actId="20577"/>
-      <pc:docMkLst>
-        <pc:docMk/>
-      </pc:docMkLst>
-      <pc:sldChg chg="modSp">
-        <pc:chgData name="Graf Thomas, INI-NET-DCF" userId="487bc3e3-9ce7-4cdd-b7b4-8899ea88d289" providerId="ADAL" clId="{36E6DFBC-EB3C-4D3C-97F7-C6A855FFE787}" dt="2020-07-27T12:02:41.304" v="1" actId="20577"/>
-        <pc:sldMkLst>
-          <pc:docMk/>
-          <pc:sldMk cId="3529422000" sldId="1048"/>
-        </pc:sldMkLst>
-        <pc:spChg chg="mod">
-          <ac:chgData name="Graf Thomas, INI-NET-DCF" userId="487bc3e3-9ce7-4cdd-b7b4-8899ea88d289" providerId="ADAL" clId="{36E6DFBC-EB3C-4D3C-97F7-C6A855FFE787}" dt="2020-07-27T12:02:41.304" v="1" actId="20577"/>
-          <ac:spMkLst>
-            <pc:docMk/>
-            <pc:sldMk cId="3529422000" sldId="1048"/>
-            <ac:spMk id="5" creationId="{C26208B2-0D10-4C23-B2DE-372A62E98644}"/>
           </ac:spMkLst>
         </pc:spChg>
       </pc:sldChg>
@@ -1412,7 +1490,7 @@
           <a:p>
             <a:fld id="{E5E705E9-673F-4AC4-B29E-A7B26F3B8523}" type="datetimeFigureOut">
               <a:rPr lang="de-CH" smtClean="0"/>
-              <a:t>13.07.2023</a:t>
+              <a:t>24.07.2023</a:t>
             </a:fld>
             <a:endParaRPr lang="de-CH"/>
           </a:p>
@@ -1829,7 +1907,7 @@
           <a:p>
             <a:fld id="{9E9B238C-2335-4007-98C9-471C02CC43B6}" type="datetimeFigureOut">
               <a:rPr lang="de-CH" smtClean="0"/>
-              <a:t>13.07.2023</a:t>
+              <a:t>24.07.2023</a:t>
             </a:fld>
             <a:endParaRPr lang="de-CH"/>
           </a:p>
@@ -2029,7 +2107,7 @@
           <a:p>
             <a:fld id="{9E9B238C-2335-4007-98C9-471C02CC43B6}" type="datetimeFigureOut">
               <a:rPr lang="de-CH" smtClean="0"/>
-              <a:t>13.07.2023</a:t>
+              <a:t>24.07.2023</a:t>
             </a:fld>
             <a:endParaRPr lang="de-CH"/>
           </a:p>
@@ -2239,7 +2317,7 @@
           <a:p>
             <a:fld id="{9E9B238C-2335-4007-98C9-471C02CC43B6}" type="datetimeFigureOut">
               <a:rPr lang="de-CH" smtClean="0"/>
-              <a:t>13.07.2023</a:t>
+              <a:t>24.07.2023</a:t>
             </a:fld>
             <a:endParaRPr lang="de-CH"/>
           </a:p>
@@ -2439,7 +2517,7 @@
           <a:p>
             <a:fld id="{9E9B238C-2335-4007-98C9-471C02CC43B6}" type="datetimeFigureOut">
               <a:rPr lang="de-CH" smtClean="0"/>
-              <a:t>13.07.2023</a:t>
+              <a:t>24.07.2023</a:t>
             </a:fld>
             <a:endParaRPr lang="de-CH"/>
           </a:p>
@@ -2715,7 +2793,7 @@
           <a:p>
             <a:fld id="{9E9B238C-2335-4007-98C9-471C02CC43B6}" type="datetimeFigureOut">
               <a:rPr lang="de-CH" smtClean="0"/>
-              <a:t>13.07.2023</a:t>
+              <a:t>24.07.2023</a:t>
             </a:fld>
             <a:endParaRPr lang="de-CH"/>
           </a:p>
@@ -2983,7 +3061,7 @@
           <a:p>
             <a:fld id="{9E9B238C-2335-4007-98C9-471C02CC43B6}" type="datetimeFigureOut">
               <a:rPr lang="de-CH" smtClean="0"/>
-              <a:t>13.07.2023</a:t>
+              <a:t>24.07.2023</a:t>
             </a:fld>
             <a:endParaRPr lang="de-CH"/>
           </a:p>
@@ -3398,7 +3476,7 @@
           <a:p>
             <a:fld id="{9E9B238C-2335-4007-98C9-471C02CC43B6}" type="datetimeFigureOut">
               <a:rPr lang="de-CH" smtClean="0"/>
-              <a:t>13.07.2023</a:t>
+              <a:t>24.07.2023</a:t>
             </a:fld>
             <a:endParaRPr lang="de-CH"/>
           </a:p>
@@ -3540,7 +3618,7 @@
           <a:p>
             <a:fld id="{9E9B238C-2335-4007-98C9-471C02CC43B6}" type="datetimeFigureOut">
               <a:rPr lang="de-CH" smtClean="0"/>
-              <a:t>13.07.2023</a:t>
+              <a:t>24.07.2023</a:t>
             </a:fld>
             <a:endParaRPr lang="de-CH"/>
           </a:p>
@@ -3653,7 +3731,7 @@
           <a:p>
             <a:fld id="{9E9B238C-2335-4007-98C9-471C02CC43B6}" type="datetimeFigureOut">
               <a:rPr lang="de-CH" smtClean="0"/>
-              <a:t>13.07.2023</a:t>
+              <a:t>24.07.2023</a:t>
             </a:fld>
             <a:endParaRPr lang="de-CH"/>
           </a:p>
@@ -3966,7 +4044,7 @@
           <a:p>
             <a:fld id="{9E9B238C-2335-4007-98C9-471C02CC43B6}" type="datetimeFigureOut">
               <a:rPr lang="de-CH" smtClean="0"/>
-              <a:t>13.07.2023</a:t>
+              <a:t>24.07.2023</a:t>
             </a:fld>
             <a:endParaRPr lang="de-CH"/>
           </a:p>
@@ -4255,7 +4333,7 @@
           <a:p>
             <a:fld id="{9E9B238C-2335-4007-98C9-471C02CC43B6}" type="datetimeFigureOut">
               <a:rPr lang="de-CH" smtClean="0"/>
-              <a:t>13.07.2023</a:t>
+              <a:t>24.07.2023</a:t>
             </a:fld>
             <a:endParaRPr lang="de-CH"/>
           </a:p>
@@ -4498,7 +4576,7 @@
           <a:p>
             <a:fld id="{9E9B238C-2335-4007-98C9-471C02CC43B6}" type="datetimeFigureOut">
               <a:rPr lang="de-CH" smtClean="0"/>
-              <a:t>13.07.2023</a:t>
+              <a:t>24.07.2023</a:t>
             </a:fld>
             <a:endParaRPr lang="de-CH"/>
           </a:p>
@@ -5372,7 +5450,7 @@
               <a:rPr lang="de-CH" sz="3800" dirty="0">
                 <a:latin typeface="+mj-lt"/>
               </a:rPr>
-              <a:t>13. </a:t>
+              <a:t>24. </a:t>
             </a:r>
             <a:r>
               <a:rPr lang="de-CH" sz="3800" dirty="0" err="1">
@@ -5769,6 +5847,61 @@
               </a:spcAft>
             </a:pPr>
             <a:r>
+              <a:rPr lang="en-US" sz="1800" dirty="0" err="1">
+                <a:latin typeface="Calibri" panose="020F0502020204030204" pitchFamily="34" charset="0"/>
+              </a:rPr>
+              <a:t>Fluvia</a:t>
+            </a:r>
+            <a:r>
+              <a:rPr lang="en-US" sz="1800" dirty="0">
+                <a:latin typeface="Calibri" panose="020F0502020204030204" pitchFamily="34" charset="0"/>
+              </a:rPr>
+              <a:t> XDP/</a:t>
+            </a:r>
+            <a:r>
+              <a:rPr lang="en-US" sz="1800" dirty="0" err="1">
+                <a:latin typeface="Calibri" panose="020F0502020204030204" pitchFamily="34" charset="0"/>
+              </a:rPr>
+              <a:t>eBPF</a:t>
+            </a:r>
+            <a:r>
+              <a:rPr lang="en-US" sz="1800" dirty="0">
+                <a:latin typeface="Calibri" panose="020F0502020204030204" pitchFamily="34" charset="0"/>
+              </a:rPr>
+              <a:t> implementation at IETF 117 hackathon</a:t>
+            </a:r>
+            <a:br>
+              <a:rPr lang="en-US" sz="1800" dirty="0">
+                <a:latin typeface="Calibri" panose="020F0502020204030204" pitchFamily="34" charset="0"/>
+              </a:rPr>
+            </a:br>
+            <a:r>
+              <a:rPr lang="en-US" sz="1800" dirty="0">
+                <a:latin typeface="Calibri" panose="020F0502020204030204" pitchFamily="34" charset="0"/>
+              </a:rPr>
+              <a:t>(</a:t>
+            </a:r>
+            <a:r>
+              <a:rPr lang="en-US" sz="1800" dirty="0">
+                <a:latin typeface="Calibri" panose="020F0502020204030204" pitchFamily="34" charset="0"/>
+                <a:hlinkClick r:id="rId6"/>
+              </a:rPr>
+              <a:t>https://github.com/nttcom/fluvia</a:t>
+            </a:r>
+            <a:r>
+              <a:rPr lang="en-US" sz="1800" dirty="0">
+                <a:latin typeface="Calibri" panose="020F0502020204030204" pitchFamily="34" charset="0"/>
+              </a:rPr>
+              <a:t>)</a:t>
+            </a:r>
+          </a:p>
+          <a:p>
+            <a:pPr marL="0" marR="0">
+              <a:spcAft>
+                <a:spcPts val="0"/>
+              </a:spcAft>
+            </a:pPr>
+            <a:r>
               <a:rPr lang="en-US" sz="1800" dirty="0">
                 <a:effectLst/>
                 <a:latin typeface="Calibri" panose="020F0502020204030204" pitchFamily="34" charset="0"/>
@@ -5851,7 +5984,7 @@
           <p:nvPr/>
         </p:nvPicPr>
         <p:blipFill>
-          <a:blip r:embed="rId6"/>
+          <a:blip r:embed="rId7"/>
           <a:stretch>
             <a:fillRect/>
           </a:stretch>
@@ -6121,7 +6254,7 @@
               <a:rPr lang="de-CH" sz="3800" dirty="0">
                 <a:latin typeface="+mj-lt"/>
               </a:rPr>
-              <a:t>13. </a:t>
+              <a:t>24. </a:t>
             </a:r>
             <a:r>
               <a:rPr lang="de-CH" sz="3800" dirty="0" err="1">
@@ -6367,16 +6500,76 @@
             </a:endParaRPr>
           </a:p>
           <a:p>
-            <a:pPr marL="0" marR="0" indent="0">
+            <a:pPr marL="0" indent="0">
+              <a:buNone/>
+            </a:pPr>
+            <a:r>
+              <a:rPr lang="en-US" sz="2000" b="1" dirty="0">
+                <a:latin typeface="Calibri" panose="020F0502020204030204" pitchFamily="34" charset="0"/>
+                <a:ea typeface="Times New Roman" panose="02020603050405020304" pitchFamily="18" charset="0"/>
+              </a:rPr>
+              <a:t>Implementation Status</a:t>
+            </a:r>
+            <a:endParaRPr lang="en-US" sz="2000" dirty="0">
+              <a:effectLst/>
+              <a:latin typeface="Calibri" panose="020F0502020204030204" pitchFamily="34" charset="0"/>
+              <a:ea typeface="Times New Roman" panose="02020603050405020304" pitchFamily="18" charset="0"/>
+            </a:endParaRPr>
+          </a:p>
+          <a:p>
+            <a:pPr marL="0" marR="0">
               <a:spcAft>
                 <a:spcPts val="0"/>
               </a:spcAft>
-              <a:buNone/>
             </a:pPr>
-            <a:endParaRPr lang="de-CH" sz="2000" b="1" dirty="0">
-              <a:latin typeface="Calibri" panose="020F0502020204030204" pitchFamily="34" charset="0"/>
-              <a:ea typeface="Times New Roman" panose="02020603050405020304" pitchFamily="18" charset="0"/>
-            </a:endParaRPr>
+            <a:r>
+              <a:rPr lang="en-US" sz="2000" dirty="0" err="1">
+                <a:latin typeface="Calibri" panose="020F0502020204030204" pitchFamily="34" charset="0"/>
+              </a:rPr>
+              <a:t>Fluvia</a:t>
+            </a:r>
+            <a:r>
+              <a:rPr lang="en-US" sz="2000" dirty="0">
+                <a:latin typeface="Calibri" panose="020F0502020204030204" pitchFamily="34" charset="0"/>
+              </a:rPr>
+              <a:t> XDP/</a:t>
+            </a:r>
+            <a:r>
+              <a:rPr lang="en-US" sz="2000" dirty="0" err="1">
+                <a:latin typeface="Calibri" panose="020F0502020204030204" pitchFamily="34" charset="0"/>
+              </a:rPr>
+              <a:t>eBPF</a:t>
+            </a:r>
+            <a:r>
+              <a:rPr lang="en-US" sz="2000" dirty="0">
+                <a:latin typeface="Calibri" panose="020F0502020204030204" pitchFamily="34" charset="0"/>
+              </a:rPr>
+              <a:t> implementation at IETF 117 hackathon</a:t>
+            </a:r>
+            <a:br>
+              <a:rPr lang="en-US" sz="2000" dirty="0">
+                <a:latin typeface="Calibri" panose="020F0502020204030204" pitchFamily="34" charset="0"/>
+              </a:rPr>
+            </a:br>
+            <a:r>
+              <a:rPr lang="en-US" sz="2000" dirty="0">
+                <a:latin typeface="Calibri" panose="020F0502020204030204" pitchFamily="34" charset="0"/>
+              </a:rPr>
+              <a:t>(</a:t>
+            </a:r>
+            <a:r>
+              <a:rPr lang="en-US" sz="2000" dirty="0">
+                <a:latin typeface="Calibri" panose="020F0502020204030204" pitchFamily="34" charset="0"/>
+                <a:hlinkClick r:id="rId2"/>
+              </a:rPr>
+              <a:t>https://github.com/nttcom/fluvia</a:t>
+            </a:r>
+            <a:r>
+              <a:rPr lang="en-US" sz="2000" dirty="0">
+                <a:latin typeface="Calibri" panose="020F0502020204030204" pitchFamily="34" charset="0"/>
+              </a:rPr>
+              <a:t>)</a:t>
+            </a:r>
           </a:p>
           <a:p>
             <a:pPr marL="0" marR="0" indent="0">
@@ -6460,83 +6653,83 @@
             <a:pPr marL="457200" lvl="1"/>
             <a:r>
               <a:rPr lang="en-US" sz="2000" u="sng" dirty="0">
-                <a:hlinkClick r:id="rId2"/>
+                <a:hlinkClick r:id="rId3"/>
               </a:rPr>
               <a:t>draft-</a:t>
             </a:r>
             <a:r>
               <a:rPr lang="en-US" sz="2000" u="sng" dirty="0" err="1">
-                <a:hlinkClick r:id="rId2"/>
+                <a:hlinkClick r:id="rId3"/>
               </a:rPr>
               <a:t>ahuang</a:t>
             </a:r>
-            <a:r>
-              <a:rPr lang="en-US" sz="2000" u="sng" dirty="0">
-                <a:hlinkClick r:id="rId2"/>
-              </a:rPr>
-              <a:t>-</a:t>
-            </a:r>
-            <a:r>
-              <a:rPr lang="en-US" sz="2000" u="sng" dirty="0" err="1">
-                <a:hlinkClick r:id="rId2"/>
-              </a:rPr>
-              <a:t>ioam</a:t>
-            </a:r>
-            <a:r>
-              <a:rPr lang="en-US" sz="2000" u="sng" dirty="0">
-                <a:hlinkClick r:id="rId2"/>
-              </a:rPr>
-              <a:t>-on-path-delay</a:t>
-            </a:r>
-            <a:endParaRPr lang="en-US" sz="2000" dirty="0"/>
-          </a:p>
-          <a:p>
-            <a:pPr marL="457200" lvl="1"/>
             <a:r>
               <a:rPr lang="en-US" sz="2000" u="sng" dirty="0">
                 <a:hlinkClick r:id="rId3"/>
               </a:rPr>
-              <a:t>draft-</a:t>
+              <a:t>-</a:t>
             </a:r>
             <a:r>
               <a:rPr lang="en-US" sz="2000" u="sng" dirty="0" err="1">
                 <a:hlinkClick r:id="rId3"/>
               </a:rPr>
-              <a:t>ahuang</a:t>
+              <a:t>ioam</a:t>
             </a:r>
             <a:r>
               <a:rPr lang="en-US" sz="2000" u="sng" dirty="0">
                 <a:hlinkClick r:id="rId3"/>
               </a:rPr>
+              <a:t>-on-path-delay</a:t>
+            </a:r>
+            <a:endParaRPr lang="en-US" sz="2000" dirty="0"/>
+          </a:p>
+          <a:p>
+            <a:pPr marL="457200" lvl="1"/>
+            <a:r>
+              <a:rPr lang="en-US" sz="2000" u="sng" dirty="0">
+                <a:hlinkClick r:id="rId4"/>
+              </a:rPr>
+              <a:t>draft-</a:t>
+            </a:r>
+            <a:r>
+              <a:rPr lang="en-US" sz="2000" u="sng" dirty="0" err="1">
+                <a:hlinkClick r:id="rId4"/>
+              </a:rPr>
+              <a:t>ahuang</a:t>
+            </a:r>
+            <a:r>
+              <a:rPr lang="en-US" sz="2000" u="sng" dirty="0">
+                <a:hlinkClick r:id="rId4"/>
+              </a:rPr>
               <a:t>-</a:t>
             </a:r>
             <a:r>
               <a:rPr lang="en-US" sz="2000" u="sng" dirty="0" err="1">
-                <a:hlinkClick r:id="rId3"/>
+                <a:hlinkClick r:id="rId4"/>
               </a:rPr>
               <a:t>ippm</a:t>
             </a:r>
             <a:r>
               <a:rPr lang="en-US" sz="2000" u="sng" dirty="0">
-                <a:hlinkClick r:id="rId3"/>
+                <a:hlinkClick r:id="rId4"/>
               </a:rPr>
               <a:t>-</a:t>
             </a:r>
             <a:r>
               <a:rPr lang="en-US" sz="2000" u="sng" dirty="0" err="1">
-                <a:hlinkClick r:id="rId3"/>
+                <a:hlinkClick r:id="rId4"/>
               </a:rPr>
               <a:t>dex</a:t>
             </a:r>
             <a:r>
               <a:rPr lang="en-US" sz="2000" u="sng" dirty="0">
-                <a:hlinkClick r:id="rId3"/>
+                <a:hlinkClick r:id="rId4"/>
               </a:rPr>
               <a:t>-timestamp-</a:t>
             </a:r>
             <a:r>
               <a:rPr lang="en-US" sz="2000" u="sng" dirty="0" err="1">
-                <a:hlinkClick r:id="rId3"/>
+                <a:hlinkClick r:id="rId4"/>
               </a:rPr>
               <a:t>ext</a:t>
             </a:r>
@@ -6599,7 +6792,7 @@
           <p:nvPr/>
         </p:nvPicPr>
         <p:blipFill>
-          <a:blip r:embed="rId4"/>
+          <a:blip r:embed="rId5"/>
           <a:stretch>
             <a:fillRect/>
           </a:stretch>
@@ -6869,7 +7062,7 @@
               <a:rPr lang="de-CH" sz="3800" dirty="0">
                 <a:latin typeface="+mj-lt"/>
               </a:rPr>
-              <a:t>13. </a:t>
+              <a:t>24. </a:t>
             </a:r>
             <a:r>
               <a:rPr lang="de-CH" sz="3800" dirty="0" err="1">

</xml_diff>